<commit_message>
add link to course webpage
</commit_message>
<xml_diff>
--- a/course_intro.pptx
+++ b/course_intro.pptx
@@ -291,7 +291,7 @@
           <a:p>
             <a:fld id="{68EFDCB5-6D71-EB44-9F0A-D3622F5F58F7}" type="datetimeFigureOut">
               <a:rPr lang="en-US" smtClean="0"/>
-              <a:t>27/05/2013</a:t>
+              <a:t>28/07/2013</a:t>
             </a:fld>
             <a:endParaRPr lang="en-US"/>
           </a:p>
@@ -461,7 +461,7 @@
           <a:p>
             <a:fld id="{68EFDCB5-6D71-EB44-9F0A-D3622F5F58F7}" type="datetimeFigureOut">
               <a:rPr lang="en-US" smtClean="0"/>
-              <a:t>27/05/2013</a:t>
+              <a:t>28/07/2013</a:t>
             </a:fld>
             <a:endParaRPr lang="en-US"/>
           </a:p>
@@ -641,7 +641,7 @@
           <a:p>
             <a:fld id="{68EFDCB5-6D71-EB44-9F0A-D3622F5F58F7}" type="datetimeFigureOut">
               <a:rPr lang="en-US" smtClean="0"/>
-              <a:t>27/05/2013</a:t>
+              <a:t>28/07/2013</a:t>
             </a:fld>
             <a:endParaRPr lang="en-US"/>
           </a:p>
@@ -811,7 +811,7 @@
           <a:p>
             <a:fld id="{68EFDCB5-6D71-EB44-9F0A-D3622F5F58F7}" type="datetimeFigureOut">
               <a:rPr lang="en-US" smtClean="0"/>
-              <a:t>27/05/2013</a:t>
+              <a:t>28/07/2013</a:t>
             </a:fld>
             <a:endParaRPr lang="en-US"/>
           </a:p>
@@ -1057,7 +1057,7 @@
           <a:p>
             <a:fld id="{68EFDCB5-6D71-EB44-9F0A-D3622F5F58F7}" type="datetimeFigureOut">
               <a:rPr lang="en-US" smtClean="0"/>
-              <a:t>27/05/2013</a:t>
+              <a:t>28/07/2013</a:t>
             </a:fld>
             <a:endParaRPr lang="en-US"/>
           </a:p>
@@ -1345,7 +1345,7 @@
           <a:p>
             <a:fld id="{68EFDCB5-6D71-EB44-9F0A-D3622F5F58F7}" type="datetimeFigureOut">
               <a:rPr lang="en-US" smtClean="0"/>
-              <a:t>27/05/2013</a:t>
+              <a:t>28/07/2013</a:t>
             </a:fld>
             <a:endParaRPr lang="en-US"/>
           </a:p>
@@ -1767,7 +1767,7 @@
           <a:p>
             <a:fld id="{68EFDCB5-6D71-EB44-9F0A-D3622F5F58F7}" type="datetimeFigureOut">
               <a:rPr lang="en-US" smtClean="0"/>
-              <a:t>27/05/2013</a:t>
+              <a:t>28/07/2013</a:t>
             </a:fld>
             <a:endParaRPr lang="en-US"/>
           </a:p>
@@ -1885,7 +1885,7 @@
           <a:p>
             <a:fld id="{68EFDCB5-6D71-EB44-9F0A-D3622F5F58F7}" type="datetimeFigureOut">
               <a:rPr lang="en-US" smtClean="0"/>
-              <a:t>27/05/2013</a:t>
+              <a:t>28/07/2013</a:t>
             </a:fld>
             <a:endParaRPr lang="en-US"/>
           </a:p>
@@ -1980,7 +1980,7 @@
           <a:p>
             <a:fld id="{68EFDCB5-6D71-EB44-9F0A-D3622F5F58F7}" type="datetimeFigureOut">
               <a:rPr lang="en-US" smtClean="0"/>
-              <a:t>27/05/2013</a:t>
+              <a:t>28/07/2013</a:t>
             </a:fld>
             <a:endParaRPr lang="en-US"/>
           </a:p>
@@ -2257,7 +2257,7 @@
           <a:p>
             <a:fld id="{68EFDCB5-6D71-EB44-9F0A-D3622F5F58F7}" type="datetimeFigureOut">
               <a:rPr lang="en-US" smtClean="0"/>
-              <a:t>27/05/2013</a:t>
+              <a:t>28/07/2013</a:t>
             </a:fld>
             <a:endParaRPr lang="en-US"/>
           </a:p>
@@ -2510,7 +2510,7 @@
           <a:p>
             <a:fld id="{68EFDCB5-6D71-EB44-9F0A-D3622F5F58F7}" type="datetimeFigureOut">
               <a:rPr lang="en-US" smtClean="0"/>
-              <a:t>27/05/2013</a:t>
+              <a:t>28/07/2013</a:t>
             </a:fld>
             <a:endParaRPr lang="en-US"/>
           </a:p>
@@ -2723,7 +2723,7 @@
           <a:p>
             <a:fld id="{68EFDCB5-6D71-EB44-9F0A-D3622F5F58F7}" type="datetimeFigureOut">
               <a:rPr lang="en-US" smtClean="0"/>
-              <a:t>27/05/2013</a:t>
+              <a:t>28/07/2013</a:t>
             </a:fld>
             <a:endParaRPr lang="en-US"/>
           </a:p>
@@ -3139,49 +3139,39 @@
         </p:spPr>
         <p:txBody>
           <a:bodyPr>
-            <a:normAutofit fontScale="77500" lnSpcReduction="20000"/>
+            <a:normAutofit/>
           </a:bodyPr>
           <a:lstStyle/>
           <a:p>
             <a:r>
-              <a:rPr lang="en-US" dirty="0" smtClean="0"/>
-              <a:t>Tim Stevens, </a:t>
-            </a:r>
-            <a:r>
-              <a:rPr lang="en-US" dirty="0" err="1" smtClean="0"/>
-              <a:t>Babraham</a:t>
-            </a:r>
-            <a:r>
-              <a:rPr lang="en-US" dirty="0" smtClean="0"/>
-              <a:t> Institute</a:t>
-            </a:r>
-          </a:p>
-          <a:p>
-            <a:r>
-              <a:rPr lang="en-US" dirty="0" smtClean="0"/>
-              <a:t>Graham Ritchie, EMBL-EBI &amp; Sanger Institute</a:t>
-            </a:r>
-          </a:p>
-          <a:p>
-            <a:r>
-              <a:rPr lang="en-US" dirty="0" smtClean="0"/>
+              <a:rPr lang="en-US" sz="2600" dirty="0" smtClean="0"/>
+              <a:t>Graham </a:t>
+            </a:r>
+            <a:r>
+              <a:rPr lang="en-US" sz="2600" dirty="0" smtClean="0"/>
+              <a:t>Ritchie, EMBL-EBI &amp; Sanger Institute</a:t>
+            </a:r>
+          </a:p>
+          <a:p>
+            <a:r>
+              <a:rPr lang="en-US" sz="2600" dirty="0" smtClean="0"/>
               <a:t>Gabor </a:t>
             </a:r>
             <a:r>
-              <a:rPr lang="en-US" dirty="0" err="1" smtClean="0"/>
+              <a:rPr lang="en-US" sz="2600" dirty="0" err="1" smtClean="0"/>
               <a:t>Bunkoczi</a:t>
             </a:r>
             <a:r>
-              <a:rPr lang="en-US" dirty="0" smtClean="0"/>
+              <a:rPr lang="en-US" sz="2600" dirty="0" smtClean="0"/>
               <a:t>, CIMR, University of Cambridge</a:t>
             </a:r>
           </a:p>
           <a:p>
             <a:r>
-              <a:rPr lang="en-US" dirty="0" smtClean="0"/>
+              <a:rPr lang="en-US" sz="2600" dirty="0" smtClean="0"/>
               <a:t>James Morris, Sanger Institute</a:t>
             </a:r>
-            <a:endParaRPr lang="en-US" dirty="0"/>
+            <a:endParaRPr lang="en-US" sz="2600" dirty="0"/>
           </a:p>
         </p:txBody>
       </p:sp>
@@ -3513,7 +3503,7 @@
         <p:spPr/>
         <p:txBody>
           <a:bodyPr>
-            <a:normAutofit fontScale="92500"/>
+            <a:normAutofit/>
           </a:bodyPr>
           <a:lstStyle/>
           <a:p>
@@ -3524,7 +3514,7 @@
             </a:pPr>
             <a:r>
               <a:rPr lang="en-US" dirty="0" smtClean="0"/>
-              <a:t>You can follow along with the material for each of the four sections at the following URLs:</a:t>
+              <a:t>There is a course webpage with links to the materials, example solutions to the exercises etc.:</a:t>
             </a:r>
           </a:p>
           <a:p>
@@ -3534,66 +3524,12 @@
               </a:spcAft>
             </a:pPr>
             <a:r>
-              <a:rPr lang="en-US" dirty="0" smtClean="0">
+              <a:rPr lang="en-US" sz="3200" dirty="0" smtClean="0">
                 <a:hlinkClick r:id="rId2"/>
               </a:rPr>
-              <a:t>http://</a:t>
-            </a:r>
-            <a:r>
-              <a:rPr lang="en-US" dirty="0" err="1" smtClean="0">
-                <a:hlinkClick r:id="rId2"/>
-              </a:rPr>
-              <a:t>bit.ly</a:t>
-            </a:r>
-            <a:r>
-              <a:rPr lang="en-US" dirty="0" smtClean="0">
-                <a:hlinkClick r:id="rId2"/>
-              </a:rPr>
-              <a:t>/gslspython1</a:t>
-            </a:r>
-            <a:endParaRPr lang="en-US" dirty="0" smtClean="0"/>
-          </a:p>
-          <a:p>
-            <a:pPr lvl="1">
-              <a:spcAft>
-                <a:spcPts val="600"/>
-              </a:spcAft>
-            </a:pPr>
-            <a:r>
-              <a:rPr lang="en-US" dirty="0" smtClean="0">
-                <a:hlinkClick r:id="rId3"/>
-              </a:rPr>
-              <a:t>http://bit.ly/gslspython2</a:t>
-            </a:r>
-            <a:endParaRPr lang="en-US" dirty="0" smtClean="0"/>
-          </a:p>
-          <a:p>
-            <a:pPr lvl="1">
-              <a:spcAft>
-                <a:spcPts val="600"/>
-              </a:spcAft>
-            </a:pPr>
-            <a:r>
-              <a:rPr lang="en-US" dirty="0" smtClean="0">
-                <a:hlinkClick r:id="rId4"/>
-              </a:rPr>
-              <a:t>http://bit.ly/gslspython3</a:t>
-            </a:r>
-            <a:endParaRPr lang="en-US" dirty="0" smtClean="0"/>
-          </a:p>
-          <a:p>
-            <a:pPr lvl="1">
-              <a:spcAft>
-                <a:spcPts val="600"/>
-              </a:spcAft>
-            </a:pPr>
-            <a:r>
-              <a:rPr lang="en-US" dirty="0" smtClean="0">
-                <a:hlinkClick r:id="rId5"/>
-              </a:rPr>
-              <a:t>http://bit.ly/gslspython4</a:t>
-            </a:r>
-            <a:endParaRPr lang="en-US" dirty="0" smtClean="0"/>
+              <a:t>http://pycam.github.io</a:t>
+            </a:r>
+            <a:endParaRPr lang="en-US" sz="3200" dirty="0" smtClean="0"/>
           </a:p>
           <a:p>
             <a:pPr>
@@ -3603,7 +3539,26 @@
             </a:pPr>
             <a:r>
               <a:rPr lang="en-US" dirty="0" smtClean="0"/>
-              <a:t>NB: this material is still in development, feedback is welcome!</a:t>
+              <a:t>You are encouraged </a:t>
+            </a:r>
+            <a:r>
+              <a:rPr lang="en-US" dirty="0" smtClean="0"/>
+              <a:t>to follow along with the materials</a:t>
+            </a:r>
+          </a:p>
+          <a:p>
+            <a:pPr>
+              <a:spcAft>
+                <a:spcPts val="600"/>
+              </a:spcAft>
+            </a:pPr>
+            <a:r>
+              <a:rPr lang="en-US" dirty="0" smtClean="0"/>
+              <a:t>NB</a:t>
+            </a:r>
+            <a:r>
+              <a:rPr lang="en-US" dirty="0" smtClean="0"/>
+              <a:t>: this material is still in development, feedback is welcome!</a:t>
             </a:r>
           </a:p>
         </p:txBody>

</xml_diff>